<commit_message>
add layout & index
</commit_message>
<xml_diff>
--- a/初步版面規劃.pptx
+++ b/初步版面規劃.pptx
@@ -7,6 +7,7 @@
   <p:sldIdLst>
     <p:sldId id="256" r:id="rId2"/>
     <p:sldId id="257" r:id="rId3"/>
+    <p:sldId id="258" r:id="rId4"/>
   </p:sldIdLst>
   <p:sldSz cx="6858000" cy="12192000"/>
   <p:notesSz cx="6858000" cy="9144000"/>
@@ -105,6 +106,11 @@
       </a:defRPr>
     </a:lvl9pPr>
   </p:defaultTextStyle>
+  <p:extLst>
+    <p:ext uri="{EFAFB233-063F-42B5-8137-9DF3F51BA10A}">
+      <p15:sldGuideLst xmlns:p15="http://schemas.microsoft.com/office/powerpoint/2012/main"/>
+    </p:ext>
+  </p:extLst>
 </p:presentation>
 </file>
 
@@ -239,7 +245,7 @@
           <a:p>
             <a:fld id="{1143FE0D-8082-49E6-AA36-D104439B8921}" type="datetimeFigureOut">
               <a:rPr lang="zh-TW" altLang="en-US" smtClean="0"/>
-              <a:t>2021/7/18</a:t>
+              <a:t>2021/7/20</a:t>
             </a:fld>
             <a:endParaRPr lang="zh-TW" altLang="en-US"/>
           </a:p>
@@ -409,7 +415,7 @@
           <a:p>
             <a:fld id="{1143FE0D-8082-49E6-AA36-D104439B8921}" type="datetimeFigureOut">
               <a:rPr lang="zh-TW" altLang="en-US" smtClean="0"/>
-              <a:t>2021/7/18</a:t>
+              <a:t>2021/7/20</a:t>
             </a:fld>
             <a:endParaRPr lang="zh-TW" altLang="en-US"/>
           </a:p>
@@ -589,7 +595,7 @@
           <a:p>
             <a:fld id="{1143FE0D-8082-49E6-AA36-D104439B8921}" type="datetimeFigureOut">
               <a:rPr lang="zh-TW" altLang="en-US" smtClean="0"/>
-              <a:t>2021/7/18</a:t>
+              <a:t>2021/7/20</a:t>
             </a:fld>
             <a:endParaRPr lang="zh-TW" altLang="en-US"/>
           </a:p>
@@ -759,7 +765,7 @@
           <a:p>
             <a:fld id="{1143FE0D-8082-49E6-AA36-D104439B8921}" type="datetimeFigureOut">
               <a:rPr lang="zh-TW" altLang="en-US" smtClean="0"/>
-              <a:t>2021/7/18</a:t>
+              <a:t>2021/7/20</a:t>
             </a:fld>
             <a:endParaRPr lang="zh-TW" altLang="en-US"/>
           </a:p>
@@ -1003,7 +1009,7 @@
           <a:p>
             <a:fld id="{1143FE0D-8082-49E6-AA36-D104439B8921}" type="datetimeFigureOut">
               <a:rPr lang="zh-TW" altLang="en-US" smtClean="0"/>
-              <a:t>2021/7/18</a:t>
+              <a:t>2021/7/20</a:t>
             </a:fld>
             <a:endParaRPr lang="zh-TW" altLang="en-US"/>
           </a:p>
@@ -1235,7 +1241,7 @@
           <a:p>
             <a:fld id="{1143FE0D-8082-49E6-AA36-D104439B8921}" type="datetimeFigureOut">
               <a:rPr lang="zh-TW" altLang="en-US" smtClean="0"/>
-              <a:t>2021/7/18</a:t>
+              <a:t>2021/7/20</a:t>
             </a:fld>
             <a:endParaRPr lang="zh-TW" altLang="en-US"/>
           </a:p>
@@ -1602,7 +1608,7 @@
           <a:p>
             <a:fld id="{1143FE0D-8082-49E6-AA36-D104439B8921}" type="datetimeFigureOut">
               <a:rPr lang="zh-TW" altLang="en-US" smtClean="0"/>
-              <a:t>2021/7/18</a:t>
+              <a:t>2021/7/20</a:t>
             </a:fld>
             <a:endParaRPr lang="zh-TW" altLang="en-US"/>
           </a:p>
@@ -1720,7 +1726,7 @@
           <a:p>
             <a:fld id="{1143FE0D-8082-49E6-AA36-D104439B8921}" type="datetimeFigureOut">
               <a:rPr lang="zh-TW" altLang="en-US" smtClean="0"/>
-              <a:t>2021/7/18</a:t>
+              <a:t>2021/7/20</a:t>
             </a:fld>
             <a:endParaRPr lang="zh-TW" altLang="en-US"/>
           </a:p>
@@ -1815,7 +1821,7 @@
           <a:p>
             <a:fld id="{1143FE0D-8082-49E6-AA36-D104439B8921}" type="datetimeFigureOut">
               <a:rPr lang="zh-TW" altLang="en-US" smtClean="0"/>
-              <a:t>2021/7/18</a:t>
+              <a:t>2021/7/20</a:t>
             </a:fld>
             <a:endParaRPr lang="zh-TW" altLang="en-US"/>
           </a:p>
@@ -2092,7 +2098,7 @@
           <a:p>
             <a:fld id="{1143FE0D-8082-49E6-AA36-D104439B8921}" type="datetimeFigureOut">
               <a:rPr lang="zh-TW" altLang="en-US" smtClean="0"/>
-              <a:t>2021/7/18</a:t>
+              <a:t>2021/7/20</a:t>
             </a:fld>
             <a:endParaRPr lang="zh-TW" altLang="en-US"/>
           </a:p>
@@ -2349,7 +2355,7 @@
           <a:p>
             <a:fld id="{1143FE0D-8082-49E6-AA36-D104439B8921}" type="datetimeFigureOut">
               <a:rPr lang="zh-TW" altLang="en-US" smtClean="0"/>
-              <a:t>2021/7/18</a:t>
+              <a:t>2021/7/20</a:t>
             </a:fld>
             <a:endParaRPr lang="zh-TW" altLang="en-US"/>
           </a:p>
@@ -2562,7 +2568,7 @@
           <a:p>
             <a:fld id="{1143FE0D-8082-49E6-AA36-D104439B8921}" type="datetimeFigureOut">
               <a:rPr lang="zh-TW" altLang="en-US" smtClean="0"/>
-              <a:t>2021/7/18</a:t>
+              <a:t>2021/7/20</a:t>
             </a:fld>
             <a:endParaRPr lang="zh-TW" altLang="en-US"/>
           </a:p>
@@ -3970,32 +3976,19 @@
             </a:endParaRPr>
           </a:p>
           <a:p>
-            <a:pPr algn="l"/>
-            <a:r>
-              <a:rPr lang="en-US" altLang="zh-TW" b="1" i="0" dirty="0">
-                <a:solidFill>
-                  <a:srgbClr val="24292E"/>
-                </a:solidFill>
-                <a:effectLst/>
+            <a:r>
+              <a:rPr lang="en-US" altLang="zh-TW" b="1" dirty="0">
                 <a:latin typeface="-apple-system"/>
               </a:rPr>
-              <a:t>icon-clock-</a:t>
-            </a:r>
-            <a:r>
-              <a:rPr lang="en-US" altLang="zh-TW" b="1" i="0" dirty="0" err="1">
-                <a:solidFill>
-                  <a:srgbClr val="24292E"/>
-                </a:solidFill>
-                <a:effectLst/>
+              <a:t>icon-</a:t>
+            </a:r>
+            <a:r>
+              <a:rPr lang="en-US" altLang="zh-TW" b="1" dirty="0" err="1">
                 <a:latin typeface="-apple-system"/>
               </a:rPr>
-              <a:t>black.svg</a:t>
-            </a:r>
-            <a:endParaRPr lang="en-US" altLang="zh-TW" b="1" i="0" dirty="0">
-              <a:solidFill>
-                <a:srgbClr val="24292E"/>
-              </a:solidFill>
-              <a:effectLst/>
+              <a:t>clock.svg</a:t>
+            </a:r>
+            <a:endParaRPr lang="en-US" altLang="zh-TW" b="1" dirty="0">
               <a:latin typeface="-apple-system"/>
             </a:endParaRPr>
           </a:p>
@@ -4035,7 +4028,7 @@
         </p:nvSpPr>
         <p:spPr>
           <a:xfrm>
-            <a:off x="117475" y="4397375"/>
+            <a:off x="277059" y="4090874"/>
             <a:ext cx="1787525" cy="1754326"/>
           </a:xfrm>
           <a:prstGeom prst="rect">
@@ -4855,6 +4848,250 @@
     <p:extLst>
       <p:ext uri="{BB962C8B-B14F-4D97-AF65-F5344CB8AC3E}">
         <p14:creationId xmlns:p14="http://schemas.microsoft.com/office/powerpoint/2010/main" val="1118128004"/>
+      </p:ext>
+    </p:extLst>
+  </p:cSld>
+  <p:clrMapOvr>
+    <a:masterClrMapping/>
+  </p:clrMapOvr>
+</p:sld>
+</file>
+
+<file path=ppt/slides/slide3.xml><?xml version="1.0" encoding="utf-8"?>
+<p:sld xmlns:a="http://schemas.openxmlformats.org/drawingml/2006/main" xmlns:r="http://schemas.openxmlformats.org/officeDocument/2006/relationships" xmlns:p="http://schemas.openxmlformats.org/presentationml/2006/main">
+  <p:cSld>
+    <p:spTree>
+      <p:nvGrpSpPr>
+        <p:cNvPr id="1" name=""/>
+        <p:cNvGrpSpPr/>
+        <p:nvPr/>
+      </p:nvGrpSpPr>
+      <p:grpSpPr>
+        <a:xfrm>
+          <a:off x="0" y="0"/>
+          <a:ext cx="0" cy="0"/>
+          <a:chOff x="0" y="0"/>
+          <a:chExt cx="0" cy="0"/>
+        </a:xfrm>
+      </p:grpSpPr>
+      <p:pic>
+        <p:nvPicPr>
+          <p:cNvPr id="5" name="圖片 4">
+            <a:extLst>
+              <a:ext uri="{FF2B5EF4-FFF2-40B4-BE49-F238E27FC236}">
+                <a16:creationId xmlns:a16="http://schemas.microsoft.com/office/drawing/2014/main" id="{BECAE242-C396-4BFA-B090-EAC281FBF0AF}"/>
+              </a:ext>
+            </a:extLst>
+          </p:cNvPr>
+          <p:cNvPicPr>
+            <a:picLocks noChangeAspect="1"/>
+          </p:cNvPicPr>
+          <p:nvPr/>
+        </p:nvPicPr>
+        <p:blipFill>
+          <a:blip r:embed="rId2">
+            <a:extLst>
+              <a:ext uri="{28A0092B-C50C-407E-A947-70E740481C1C}">
+                <a14:useLocalDpi xmlns:a14="http://schemas.microsoft.com/office/drawing/2010/main" val="0"/>
+              </a:ext>
+            </a:extLst>
+          </a:blip>
+          <a:stretch>
+            <a:fillRect/>
+          </a:stretch>
+        </p:blipFill>
+        <p:spPr>
+          <a:xfrm>
+            <a:off x="0" y="2066925"/>
+            <a:ext cx="6858000" cy="8058150"/>
+          </a:xfrm>
+          <a:prstGeom prst="rect">
+            <a:avLst/>
+          </a:prstGeom>
+        </p:spPr>
+      </p:pic>
+      <p:sp>
+        <p:nvSpPr>
+          <p:cNvPr id="6" name="文字方塊 5">
+            <a:extLst>
+              <a:ext uri="{FF2B5EF4-FFF2-40B4-BE49-F238E27FC236}">
+                <a16:creationId xmlns:a16="http://schemas.microsoft.com/office/drawing/2014/main" id="{C4A2E7C4-CC00-43DD-93D5-2B76BC04BDFD}"/>
+              </a:ext>
+            </a:extLst>
+          </p:cNvPr>
+          <p:cNvSpPr txBox="1"/>
+          <p:nvPr/>
+        </p:nvSpPr>
+        <p:spPr>
+          <a:xfrm>
+            <a:off x="6989619" y="2419350"/>
+            <a:ext cx="3135455" cy="307777"/>
+          </a:xfrm>
+          <a:prstGeom prst="rect">
+            <a:avLst/>
+          </a:prstGeom>
+          <a:noFill/>
+          <a:ln>
+            <a:solidFill>
+              <a:schemeClr val="tx1"/>
+            </a:solidFill>
+          </a:ln>
+        </p:spPr>
+        <p:txBody>
+          <a:bodyPr wrap="square" rtlCol="0">
+            <a:spAutoFit/>
+          </a:bodyPr>
+          <a:lstStyle/>
+          <a:p>
+            <a:r>
+              <a:rPr lang="en-US" altLang="zh-TW" sz="1400" dirty="0"/>
+              <a:t>.container&gt;</a:t>
+            </a:r>
+            <a:r>
+              <a:rPr lang="en-US" altLang="zh-TW" sz="1400" dirty="0" err="1"/>
+              <a:t>ul.topnav</a:t>
+            </a:r>
+            <a:r>
+              <a:rPr lang="en-US" altLang="zh-TW" sz="1400" dirty="0"/>
+              <a:t>&gt;li*3&gt;</a:t>
+            </a:r>
+            <a:r>
+              <a:rPr lang="en-US" altLang="zh-TW" sz="1400" dirty="0" err="1"/>
+              <a:t>img+p</a:t>
+            </a:r>
+            <a:endParaRPr lang="en-US" altLang="zh-TW" sz="1400" dirty="0"/>
+          </a:p>
+        </p:txBody>
+      </p:sp>
+      <p:sp>
+        <p:nvSpPr>
+          <p:cNvPr id="7" name="文字方塊 6">
+            <a:extLst>
+              <a:ext uri="{FF2B5EF4-FFF2-40B4-BE49-F238E27FC236}">
+                <a16:creationId xmlns:a16="http://schemas.microsoft.com/office/drawing/2014/main" id="{785C3F8E-4C08-4BFE-AB35-ABF3C4D5245B}"/>
+              </a:ext>
+            </a:extLst>
+          </p:cNvPr>
+          <p:cNvSpPr txBox="1"/>
+          <p:nvPr/>
+        </p:nvSpPr>
+        <p:spPr>
+          <a:xfrm>
+            <a:off x="6989619" y="3124200"/>
+            <a:ext cx="2659205" cy="307777"/>
+          </a:xfrm>
+          <a:prstGeom prst="rect">
+            <a:avLst/>
+          </a:prstGeom>
+          <a:noFill/>
+          <a:ln>
+            <a:solidFill>
+              <a:schemeClr val="tx1"/>
+            </a:solidFill>
+          </a:ln>
+        </p:spPr>
+        <p:txBody>
+          <a:bodyPr wrap="square" rtlCol="0">
+            <a:spAutoFit/>
+          </a:bodyPr>
+          <a:lstStyle/>
+          <a:p>
+            <a:r>
+              <a:rPr lang="en-US" altLang="zh-TW" sz="1400" dirty="0"/>
+              <a:t>.banner&gt;</a:t>
+            </a:r>
+            <a:r>
+              <a:rPr lang="en-US" altLang="zh-TW" sz="1400" dirty="0" err="1"/>
+              <a:t>div.banner</a:t>
+            </a:r>
+            <a:r>
+              <a:rPr lang="en-US" altLang="zh-TW" sz="1400" dirty="0"/>
+              <a:t>-photo*2</a:t>
+            </a:r>
+          </a:p>
+        </p:txBody>
+      </p:sp>
+      <p:sp>
+        <p:nvSpPr>
+          <p:cNvPr id="8" name="文字方塊 7">
+            <a:extLst>
+              <a:ext uri="{FF2B5EF4-FFF2-40B4-BE49-F238E27FC236}">
+                <a16:creationId xmlns:a16="http://schemas.microsoft.com/office/drawing/2014/main" id="{EAB68C74-6844-44D7-BD19-F645F496C7F8}"/>
+              </a:ext>
+            </a:extLst>
+          </p:cNvPr>
+          <p:cNvSpPr txBox="1"/>
+          <p:nvPr/>
+        </p:nvSpPr>
+        <p:spPr>
+          <a:xfrm>
+            <a:off x="5991226" y="5279827"/>
+            <a:ext cx="5519736" cy="954107"/>
+          </a:xfrm>
+          <a:prstGeom prst="rect">
+            <a:avLst/>
+          </a:prstGeom>
+          <a:noFill/>
+          <a:ln>
+            <a:solidFill>
+              <a:schemeClr val="tx1"/>
+            </a:solidFill>
+          </a:ln>
+        </p:spPr>
+        <p:txBody>
+          <a:bodyPr wrap="square" rtlCol="0">
+            <a:spAutoFit/>
+          </a:bodyPr>
+          <a:lstStyle/>
+          <a:p>
+            <a:r>
+              <a:rPr lang="en-US" altLang="zh-TW" sz="1400" dirty="0"/>
+              <a:t>.prod-celluloid&gt;.container&gt;h2&gt;span&gt;</a:t>
+            </a:r>
+            <a:r>
+              <a:rPr lang="en-US" altLang="zh-TW" sz="1400" dirty="0" err="1"/>
+              <a:t>ul.prod</a:t>
+            </a:r>
+            <a:r>
+              <a:rPr lang="en-US" altLang="zh-TW" sz="1400" dirty="0"/>
+              <a:t>-info&gt;li*12&gt;a&gt;</a:t>
+            </a:r>
+            <a:r>
+              <a:rPr lang="en-US" altLang="zh-TW" sz="1400" dirty="0" err="1"/>
+              <a:t>img+div</a:t>
+            </a:r>
+            <a:r>
+              <a:rPr lang="en-US" altLang="zh-TW" sz="1400" dirty="0"/>
+              <a:t>&gt;p*</a:t>
+            </a:r>
+            <a:r>
+              <a:rPr lang="en-US" altLang="zh-TW" sz="1400"/>
+              <a:t>2.prod-number.price+</a:t>
+            </a:r>
+            <a:r>
+              <a:rPr lang="en-US" altLang="zh-TW" sz="1400" dirty="0"/>
+              <a:t>div*2.color</a:t>
+            </a:r>
+          </a:p>
+          <a:p>
+            <a:endParaRPr lang="en-US" altLang="zh-TW" sz="1400" dirty="0"/>
+          </a:p>
+          <a:p>
+            <a:r>
+              <a:rPr lang="en-US" altLang="zh-TW" sz="1400" dirty="0" err="1"/>
+              <a:t>Ul.navbuttons</a:t>
+            </a:r>
+            <a:r>
+              <a:rPr lang="en-US" altLang="zh-TW" sz="1400" dirty="0"/>
+              <a:t>&gt;li*7&gt;a</a:t>
+            </a:r>
+          </a:p>
+        </p:txBody>
+      </p:sp>
+    </p:spTree>
+    <p:extLst>
+      <p:ext uri="{BB962C8B-B14F-4D97-AF65-F5344CB8AC3E}">
+        <p14:creationId xmlns:p14="http://schemas.microsoft.com/office/powerpoint/2010/main" val="1486119155"/>
       </p:ext>
     </p:extLst>
   </p:cSld>

</xml_diff>